<commit_message>
New 2-Peak Power Method
</commit_message>
<xml_diff>
--- a/Modified IDCT input.pptx
+++ b/Modified IDCT input.pptx
@@ -6,6 +6,7 @@
   </p:sldMasterIdLst>
   <p:sldIdLst>
     <p:sldId id="256" r:id="rId2"/>
+    <p:sldId id="257" r:id="rId3"/>
   </p:sldIdLst>
   <p:sldSz cx="12192000" cy="6858000"/>
   <p:notesSz cx="6858000" cy="9144000"/>
@@ -104,6 +105,11 @@
       </a:defRPr>
     </a:lvl9pPr>
   </p:defaultTextStyle>
+  <p:extLst>
+    <p:ext uri="{EFAFB233-063F-42B5-8137-9DF3F51BA10A}">
+      <p15:sldGuideLst xmlns:p15="http://schemas.microsoft.com/office/powerpoint/2012/main"/>
+    </p:ext>
+  </p:extLst>
 </p:presentation>
 </file>
 
@@ -149,10 +155,9 @@
           </a:lstStyle>
           <a:p>
             <a:r>
-              <a:rPr lang="en-US" smtClean="0"/>
+              <a:rPr lang="en-US"/>
               <a:t>Click to edit Master title style</a:t>
             </a:r>
-            <a:endParaRPr lang="en-US"/>
           </a:p>
         </p:txBody>
       </p:sp>
@@ -214,10 +219,9 @@
           </a:lstStyle>
           <a:p>
             <a:r>
-              <a:rPr lang="en-US" smtClean="0"/>
+              <a:rPr lang="en-US"/>
               <a:t>Click to edit Master subtitle style</a:t>
             </a:r>
-            <a:endParaRPr lang="en-US"/>
           </a:p>
         </p:txBody>
       </p:sp>
@@ -332,10 +336,9 @@
           <a:lstStyle/>
           <a:p>
             <a:r>
-              <a:rPr lang="en-US" smtClean="0"/>
+              <a:rPr lang="en-US"/>
               <a:t>Click to edit Master title style</a:t>
             </a:r>
-            <a:endParaRPr lang="en-US"/>
           </a:p>
         </p:txBody>
       </p:sp>
@@ -356,38 +359,37 @@
           <a:p>
             <a:pPr lvl="0"/>
             <a:r>
-              <a:rPr lang="en-US" smtClean="0"/>
+              <a:rPr lang="en-US"/>
               <a:t>Edit Master text styles</a:t>
             </a:r>
           </a:p>
           <a:p>
             <a:pPr lvl="1"/>
             <a:r>
-              <a:rPr lang="en-US" smtClean="0"/>
+              <a:rPr lang="en-US"/>
               <a:t>Second level</a:t>
             </a:r>
           </a:p>
           <a:p>
             <a:pPr lvl="2"/>
             <a:r>
-              <a:rPr lang="en-US" smtClean="0"/>
+              <a:rPr lang="en-US"/>
               <a:t>Third level</a:t>
             </a:r>
           </a:p>
           <a:p>
             <a:pPr lvl="3"/>
             <a:r>
-              <a:rPr lang="en-US" smtClean="0"/>
+              <a:rPr lang="en-US"/>
               <a:t>Fourth level</a:t>
             </a:r>
           </a:p>
           <a:p>
             <a:pPr lvl="4"/>
             <a:r>
-              <a:rPr lang="en-US" smtClean="0"/>
+              <a:rPr lang="en-US"/>
               <a:t>Fifth level</a:t>
             </a:r>
-            <a:endParaRPr lang="en-US"/>
           </a:p>
         </p:txBody>
       </p:sp>
@@ -507,10 +509,9 @@
           <a:lstStyle/>
           <a:p>
             <a:r>
-              <a:rPr lang="en-US" smtClean="0"/>
+              <a:rPr lang="en-US"/>
               <a:t>Click to edit Master title style</a:t>
             </a:r>
-            <a:endParaRPr lang="en-US"/>
           </a:p>
         </p:txBody>
       </p:sp>
@@ -536,38 +537,37 @@
           <a:p>
             <a:pPr lvl="0"/>
             <a:r>
-              <a:rPr lang="en-US" smtClean="0"/>
+              <a:rPr lang="en-US"/>
               <a:t>Edit Master text styles</a:t>
             </a:r>
           </a:p>
           <a:p>
             <a:pPr lvl="1"/>
             <a:r>
-              <a:rPr lang="en-US" smtClean="0"/>
+              <a:rPr lang="en-US"/>
               <a:t>Second level</a:t>
             </a:r>
           </a:p>
           <a:p>
             <a:pPr lvl="2"/>
             <a:r>
-              <a:rPr lang="en-US" smtClean="0"/>
+              <a:rPr lang="en-US"/>
               <a:t>Third level</a:t>
             </a:r>
           </a:p>
           <a:p>
             <a:pPr lvl="3"/>
             <a:r>
-              <a:rPr lang="en-US" smtClean="0"/>
+              <a:rPr lang="en-US"/>
               <a:t>Fourth level</a:t>
             </a:r>
           </a:p>
           <a:p>
             <a:pPr lvl="4"/>
             <a:r>
-              <a:rPr lang="en-US" smtClean="0"/>
+              <a:rPr lang="en-US"/>
               <a:t>Fifth level</a:t>
             </a:r>
-            <a:endParaRPr lang="en-US"/>
           </a:p>
         </p:txBody>
       </p:sp>
@@ -682,10 +682,9 @@
           <a:lstStyle/>
           <a:p>
             <a:r>
-              <a:rPr lang="en-US" smtClean="0"/>
+              <a:rPr lang="en-US"/>
               <a:t>Click to edit Master title style</a:t>
             </a:r>
-            <a:endParaRPr lang="en-US"/>
           </a:p>
         </p:txBody>
       </p:sp>
@@ -706,38 +705,37 @@
           <a:p>
             <a:pPr lvl="0"/>
             <a:r>
-              <a:rPr lang="en-US" smtClean="0"/>
+              <a:rPr lang="en-US"/>
               <a:t>Edit Master text styles</a:t>
             </a:r>
           </a:p>
           <a:p>
             <a:pPr lvl="1"/>
             <a:r>
-              <a:rPr lang="en-US" smtClean="0"/>
+              <a:rPr lang="en-US"/>
               <a:t>Second level</a:t>
             </a:r>
           </a:p>
           <a:p>
             <a:pPr lvl="2"/>
             <a:r>
-              <a:rPr lang="en-US" smtClean="0"/>
+              <a:rPr lang="en-US"/>
               <a:t>Third level</a:t>
             </a:r>
           </a:p>
           <a:p>
             <a:pPr lvl="3"/>
             <a:r>
-              <a:rPr lang="en-US" smtClean="0"/>
+              <a:rPr lang="en-US"/>
               <a:t>Fourth level</a:t>
             </a:r>
           </a:p>
           <a:p>
             <a:pPr lvl="4"/>
             <a:r>
-              <a:rPr lang="en-US" smtClean="0"/>
+              <a:rPr lang="en-US"/>
               <a:t>Fifth level</a:t>
             </a:r>
-            <a:endParaRPr lang="en-US"/>
           </a:p>
         </p:txBody>
       </p:sp>
@@ -861,10 +859,9 @@
           </a:lstStyle>
           <a:p>
             <a:r>
-              <a:rPr lang="en-US" smtClean="0"/>
+              <a:rPr lang="en-US"/>
               <a:t>Click to edit Master title style</a:t>
             </a:r>
-            <a:endParaRPr lang="en-US"/>
           </a:p>
         </p:txBody>
       </p:sp>
@@ -981,7 +978,7 @@
           <a:p>
             <a:pPr lvl="0"/>
             <a:r>
-              <a:rPr lang="en-US" smtClean="0"/>
+              <a:rPr lang="en-US"/>
               <a:t>Edit Master text styles</a:t>
             </a:r>
           </a:p>
@@ -1098,10 +1095,9 @@
           <a:lstStyle/>
           <a:p>
             <a:r>
-              <a:rPr lang="en-US" smtClean="0"/>
+              <a:rPr lang="en-US"/>
               <a:t>Click to edit Master title style</a:t>
             </a:r>
-            <a:endParaRPr lang="en-US"/>
           </a:p>
         </p:txBody>
       </p:sp>
@@ -1127,38 +1123,37 @@
           <a:p>
             <a:pPr lvl="0"/>
             <a:r>
-              <a:rPr lang="en-US" smtClean="0"/>
+              <a:rPr lang="en-US"/>
               <a:t>Edit Master text styles</a:t>
             </a:r>
           </a:p>
           <a:p>
             <a:pPr lvl="1"/>
             <a:r>
-              <a:rPr lang="en-US" smtClean="0"/>
+              <a:rPr lang="en-US"/>
               <a:t>Second level</a:t>
             </a:r>
           </a:p>
           <a:p>
             <a:pPr lvl="2"/>
             <a:r>
-              <a:rPr lang="en-US" smtClean="0"/>
+              <a:rPr lang="en-US"/>
               <a:t>Third level</a:t>
             </a:r>
           </a:p>
           <a:p>
             <a:pPr lvl="3"/>
             <a:r>
-              <a:rPr lang="en-US" smtClean="0"/>
+              <a:rPr lang="en-US"/>
               <a:t>Fourth level</a:t>
             </a:r>
           </a:p>
           <a:p>
             <a:pPr lvl="4"/>
             <a:r>
-              <a:rPr lang="en-US" smtClean="0"/>
+              <a:rPr lang="en-US"/>
               <a:t>Fifth level</a:t>
             </a:r>
-            <a:endParaRPr lang="en-US"/>
           </a:p>
         </p:txBody>
       </p:sp>
@@ -1184,38 +1179,37 @@
           <a:p>
             <a:pPr lvl="0"/>
             <a:r>
-              <a:rPr lang="en-US" smtClean="0"/>
+              <a:rPr lang="en-US"/>
               <a:t>Edit Master text styles</a:t>
             </a:r>
           </a:p>
           <a:p>
             <a:pPr lvl="1"/>
             <a:r>
-              <a:rPr lang="en-US" smtClean="0"/>
+              <a:rPr lang="en-US"/>
               <a:t>Second level</a:t>
             </a:r>
           </a:p>
           <a:p>
             <a:pPr lvl="2"/>
             <a:r>
-              <a:rPr lang="en-US" smtClean="0"/>
+              <a:rPr lang="en-US"/>
               <a:t>Third level</a:t>
             </a:r>
           </a:p>
           <a:p>
             <a:pPr lvl="3"/>
             <a:r>
-              <a:rPr lang="en-US" smtClean="0"/>
+              <a:rPr lang="en-US"/>
               <a:t>Fourth level</a:t>
             </a:r>
           </a:p>
           <a:p>
             <a:pPr lvl="4"/>
             <a:r>
-              <a:rPr lang="en-US" smtClean="0"/>
+              <a:rPr lang="en-US"/>
               <a:t>Fifth level</a:t>
             </a:r>
-            <a:endParaRPr lang="en-US"/>
           </a:p>
         </p:txBody>
       </p:sp>
@@ -1335,10 +1329,9 @@
           <a:lstStyle/>
           <a:p>
             <a:r>
-              <a:rPr lang="en-US" smtClean="0"/>
+              <a:rPr lang="en-US"/>
               <a:t>Click to edit Master title style</a:t>
             </a:r>
-            <a:endParaRPr lang="en-US"/>
           </a:p>
         </p:txBody>
       </p:sp>
@@ -1401,7 +1394,7 @@
           <a:p>
             <a:pPr lvl="0"/>
             <a:r>
-              <a:rPr lang="en-US" smtClean="0"/>
+              <a:rPr lang="en-US"/>
               <a:t>Edit Master text styles</a:t>
             </a:r>
           </a:p>
@@ -1429,38 +1422,37 @@
           <a:p>
             <a:pPr lvl="0"/>
             <a:r>
-              <a:rPr lang="en-US" smtClean="0"/>
+              <a:rPr lang="en-US"/>
               <a:t>Edit Master text styles</a:t>
             </a:r>
           </a:p>
           <a:p>
             <a:pPr lvl="1"/>
             <a:r>
-              <a:rPr lang="en-US" smtClean="0"/>
+              <a:rPr lang="en-US"/>
               <a:t>Second level</a:t>
             </a:r>
           </a:p>
           <a:p>
             <a:pPr lvl="2"/>
             <a:r>
-              <a:rPr lang="en-US" smtClean="0"/>
+              <a:rPr lang="en-US"/>
               <a:t>Third level</a:t>
             </a:r>
           </a:p>
           <a:p>
             <a:pPr lvl="3"/>
             <a:r>
-              <a:rPr lang="en-US" smtClean="0"/>
+              <a:rPr lang="en-US"/>
               <a:t>Fourth level</a:t>
             </a:r>
           </a:p>
           <a:p>
             <a:pPr lvl="4"/>
             <a:r>
-              <a:rPr lang="en-US" smtClean="0"/>
+              <a:rPr lang="en-US"/>
               <a:t>Fifth level</a:t>
             </a:r>
-            <a:endParaRPr lang="en-US"/>
           </a:p>
         </p:txBody>
       </p:sp>
@@ -1523,7 +1515,7 @@
           <a:p>
             <a:pPr lvl="0"/>
             <a:r>
-              <a:rPr lang="en-US" smtClean="0"/>
+              <a:rPr lang="en-US"/>
               <a:t>Edit Master text styles</a:t>
             </a:r>
           </a:p>
@@ -1551,38 +1543,37 @@
           <a:p>
             <a:pPr lvl="0"/>
             <a:r>
-              <a:rPr lang="en-US" smtClean="0"/>
+              <a:rPr lang="en-US"/>
               <a:t>Edit Master text styles</a:t>
             </a:r>
           </a:p>
           <a:p>
             <a:pPr lvl="1"/>
             <a:r>
-              <a:rPr lang="en-US" smtClean="0"/>
+              <a:rPr lang="en-US"/>
               <a:t>Second level</a:t>
             </a:r>
           </a:p>
           <a:p>
             <a:pPr lvl="2"/>
             <a:r>
-              <a:rPr lang="en-US" smtClean="0"/>
+              <a:rPr lang="en-US"/>
               <a:t>Third level</a:t>
             </a:r>
           </a:p>
           <a:p>
             <a:pPr lvl="3"/>
             <a:r>
-              <a:rPr lang="en-US" smtClean="0"/>
+              <a:rPr lang="en-US"/>
               <a:t>Fourth level</a:t>
             </a:r>
           </a:p>
           <a:p>
             <a:pPr lvl="4"/>
             <a:r>
-              <a:rPr lang="en-US" smtClean="0"/>
+              <a:rPr lang="en-US"/>
               <a:t>Fifth level</a:t>
             </a:r>
-            <a:endParaRPr lang="en-US"/>
           </a:p>
         </p:txBody>
       </p:sp>
@@ -1697,10 +1688,9 @@
           <a:lstStyle/>
           <a:p>
             <a:r>
-              <a:rPr lang="en-US" smtClean="0"/>
+              <a:rPr lang="en-US"/>
               <a:t>Click to edit Master title style</a:t>
             </a:r>
-            <a:endParaRPr lang="en-US"/>
           </a:p>
         </p:txBody>
       </p:sp>
@@ -1919,10 +1909,9 @@
           </a:lstStyle>
           <a:p>
             <a:r>
-              <a:rPr lang="en-US" smtClean="0"/>
+              <a:rPr lang="en-US"/>
               <a:t>Click to edit Master title style</a:t>
             </a:r>
-            <a:endParaRPr lang="en-US"/>
           </a:p>
         </p:txBody>
       </p:sp>
@@ -1976,38 +1965,37 @@
           <a:p>
             <a:pPr lvl="0"/>
             <a:r>
-              <a:rPr lang="en-US" smtClean="0"/>
+              <a:rPr lang="en-US"/>
               <a:t>Edit Master text styles</a:t>
             </a:r>
           </a:p>
           <a:p>
             <a:pPr lvl="1"/>
             <a:r>
-              <a:rPr lang="en-US" smtClean="0"/>
+              <a:rPr lang="en-US"/>
               <a:t>Second level</a:t>
             </a:r>
           </a:p>
           <a:p>
             <a:pPr lvl="2"/>
             <a:r>
-              <a:rPr lang="en-US" smtClean="0"/>
+              <a:rPr lang="en-US"/>
               <a:t>Third level</a:t>
             </a:r>
           </a:p>
           <a:p>
             <a:pPr lvl="3"/>
             <a:r>
-              <a:rPr lang="en-US" smtClean="0"/>
+              <a:rPr lang="en-US"/>
               <a:t>Fourth level</a:t>
             </a:r>
           </a:p>
           <a:p>
             <a:pPr lvl="4"/>
             <a:r>
-              <a:rPr lang="en-US" smtClean="0"/>
+              <a:rPr lang="en-US"/>
               <a:t>Fifth level</a:t>
             </a:r>
-            <a:endParaRPr lang="en-US"/>
           </a:p>
         </p:txBody>
       </p:sp>
@@ -2070,7 +2058,7 @@
           <a:p>
             <a:pPr lvl="0"/>
             <a:r>
-              <a:rPr lang="en-US" smtClean="0"/>
+              <a:rPr lang="en-US"/>
               <a:t>Edit Master text styles</a:t>
             </a:r>
           </a:p>
@@ -2196,10 +2184,9 @@
           </a:lstStyle>
           <a:p>
             <a:r>
-              <a:rPr lang="en-US" smtClean="0"/>
+              <a:rPr lang="en-US"/>
               <a:t>Click to edit Master title style</a:t>
             </a:r>
-            <a:endParaRPr lang="en-US"/>
           </a:p>
         </p:txBody>
       </p:sp>
@@ -2323,7 +2310,7 @@
           <a:p>
             <a:pPr lvl="0"/>
             <a:r>
-              <a:rPr lang="en-US" smtClean="0"/>
+              <a:rPr lang="en-US"/>
               <a:t>Edit Master text styles</a:t>
             </a:r>
           </a:p>
@@ -2455,10 +2442,9 @@
           <a:lstStyle/>
           <a:p>
             <a:r>
-              <a:rPr lang="en-US" smtClean="0"/>
+              <a:rPr lang="en-US"/>
               <a:t>Click to edit Master title style</a:t>
             </a:r>
-            <a:endParaRPr lang="en-US"/>
           </a:p>
         </p:txBody>
       </p:sp>
@@ -2489,38 +2475,37 @@
           <a:p>
             <a:pPr lvl="0"/>
             <a:r>
-              <a:rPr lang="en-US" smtClean="0"/>
+              <a:rPr lang="en-US"/>
               <a:t>Edit Master text styles</a:t>
             </a:r>
           </a:p>
           <a:p>
             <a:pPr lvl="1"/>
             <a:r>
-              <a:rPr lang="en-US" smtClean="0"/>
+              <a:rPr lang="en-US"/>
               <a:t>Second level</a:t>
             </a:r>
           </a:p>
           <a:p>
             <a:pPr lvl="2"/>
             <a:r>
-              <a:rPr lang="en-US" smtClean="0"/>
+              <a:rPr lang="en-US"/>
               <a:t>Third level</a:t>
             </a:r>
           </a:p>
           <a:p>
             <a:pPr lvl="3"/>
             <a:r>
-              <a:rPr lang="en-US" smtClean="0"/>
+              <a:rPr lang="en-US"/>
               <a:t>Fourth level</a:t>
             </a:r>
           </a:p>
           <a:p>
             <a:pPr lvl="4"/>
             <a:r>
-              <a:rPr lang="en-US" smtClean="0"/>
+              <a:rPr lang="en-US"/>
               <a:t>Fifth level</a:t>
             </a:r>
-            <a:endParaRPr lang="en-US"/>
           </a:p>
         </p:txBody>
       </p:sp>
@@ -2972,8 +2957,8 @@
         </p:nvSpPr>
         <p:spPr>
           <a:xfrm>
-            <a:off x="428263" y="1226916"/>
-            <a:ext cx="6215605" cy="4524315"/>
+            <a:off x="321937" y="590870"/>
+            <a:ext cx="4974309" cy="5355312"/>
           </a:xfrm>
           <a:prstGeom prst="rect">
             <a:avLst/>
@@ -2987,7 +2972,7 @@
           <a:lstStyle/>
           <a:p>
             <a:r>
-              <a:rPr lang="en-US" dirty="0" smtClean="0"/>
+              <a:rPr lang="en-US" b="1" dirty="0"/>
               <a:t>Previous method:</a:t>
             </a:r>
           </a:p>
@@ -2997,7 +2982,7 @@
               <a:buChar char="•"/>
             </a:pPr>
             <a:r>
-              <a:rPr lang="en-US" dirty="0" smtClean="0"/>
+              <a:rPr lang="en-US" dirty="0"/>
               <a:t>Take the maximum frequency in the vicinity of 1.2 Hz</a:t>
             </a:r>
           </a:p>
@@ -3007,7 +2992,7 @@
               <a:buChar char="•"/>
             </a:pPr>
             <a:r>
-              <a:rPr lang="en-US" dirty="0" smtClean="0"/>
+              <a:rPr lang="en-US" dirty="0"/>
               <a:t>Make the power for all other frequencies zero</a:t>
             </a:r>
           </a:p>
@@ -3017,13 +3002,13 @@
               <a:buChar char="•"/>
             </a:pPr>
             <a:r>
-              <a:rPr lang="en-US" dirty="0" smtClean="0"/>
+              <a:rPr lang="en-US" dirty="0"/>
               <a:t>Inverse FT the modified power spectrum</a:t>
             </a:r>
           </a:p>
           <a:p>
             <a:r>
-              <a:rPr lang="en-US" dirty="0" smtClean="0"/>
+              <a:rPr lang="en-US" dirty="0"/>
               <a:t>**This tends to underestimate the amplitude of the probability(time) function</a:t>
             </a:r>
           </a:p>
@@ -3031,11 +3016,17 @@
             <a:endParaRPr lang="en-US" dirty="0"/>
           </a:p>
           <a:p>
-            <a:endParaRPr lang="en-US" dirty="0" smtClean="0"/>
-          </a:p>
-          <a:p>
-            <a:r>
-              <a:rPr lang="en-US" dirty="0" smtClean="0"/>
+            <a:endParaRPr lang="en-US" dirty="0"/>
+          </a:p>
+          <a:p>
+            <a:endParaRPr lang="en-US" dirty="0"/>
+          </a:p>
+          <a:p>
+            <a:endParaRPr lang="en-US" dirty="0"/>
+          </a:p>
+          <a:p>
+            <a:r>
+              <a:rPr lang="en-US" b="1" dirty="0"/>
               <a:t>New method:</a:t>
             </a:r>
           </a:p>
@@ -3045,8 +3036,8 @@
               <a:buChar char="•"/>
             </a:pPr>
             <a:r>
-              <a:rPr lang="en-US" dirty="0" smtClean="0"/>
-              <a:t>Take two frequency bins: the one just below 1.2 Hz, and the one just above 1.2 Hz</a:t>
+              <a:rPr lang="en-US" dirty="0"/>
+              <a:t>Find the top 2 frequencies within a 0.1 Hz range of 1.2 Hz</a:t>
             </a:r>
           </a:p>
           <a:p>
@@ -3055,7 +3046,7 @@
               <a:buChar char="•"/>
             </a:pPr>
             <a:r>
-              <a:rPr lang="en-US" dirty="0" smtClean="0"/>
+              <a:rPr lang="en-US" dirty="0"/>
               <a:t>Sum those two powers</a:t>
             </a:r>
           </a:p>
@@ -3065,8 +3056,8 @@
               <a:buChar char="•"/>
             </a:pPr>
             <a:r>
-              <a:rPr lang="en-US" dirty="0" smtClean="0"/>
-              <a:t>For whichever frequency is closer to 1.2 Hz, associate the summed power with that frequency.</a:t>
+              <a:rPr lang="en-US" dirty="0"/>
+              <a:t>Associate the summed power with whatever frequency is closest to 1.2 Hz.</a:t>
             </a:r>
           </a:p>
           <a:p>
@@ -3075,7 +3066,7 @@
               <a:buChar char="•"/>
             </a:pPr>
             <a:r>
-              <a:rPr lang="en-US" dirty="0" smtClean="0"/>
+              <a:rPr lang="en-US" dirty="0"/>
               <a:t>Make the power for all other frequencies zero.</a:t>
             </a:r>
           </a:p>
@@ -3085,16 +3076,21 @@
               <a:buChar char="•"/>
             </a:pPr>
             <a:r>
-              <a:rPr lang="en-US" dirty="0" smtClean="0"/>
+              <a:rPr lang="en-US" dirty="0"/>
               <a:t>Inverse FT the modified power spectrum.</a:t>
             </a:r>
-            <a:endParaRPr lang="en-US" dirty="0"/>
           </a:p>
         </p:txBody>
       </p:sp>
       <p:pic>
         <p:nvPicPr>
-          <p:cNvPr id="5" name="Picture 4"/>
+          <p:cNvPr id="2" name="Picture 1">
+            <a:extLst>
+              <a:ext uri="{FF2B5EF4-FFF2-40B4-BE49-F238E27FC236}">
+                <a16:creationId xmlns:a16="http://schemas.microsoft.com/office/drawing/2014/main" id="{C47BA35F-6F72-41E3-996F-BECE5C53C198}"/>
+              </a:ext>
+            </a:extLst>
+          </p:cNvPr>
           <p:cNvPicPr>
             <a:picLocks noChangeAspect="1"/>
           </p:cNvPicPr>
@@ -3108,18 +3104,323 @@
         </p:blipFill>
         <p:spPr>
           <a:xfrm>
-            <a:off x="7173229" y="3995798"/>
-            <a:ext cx="3933825" cy="2686050"/>
+            <a:off x="5526961" y="3791746"/>
+            <a:ext cx="4300226" cy="3036703"/>
           </a:xfrm>
           <a:prstGeom prst="rect">
             <a:avLst/>
           </a:prstGeom>
         </p:spPr>
       </p:pic>
+      <p:pic>
+        <p:nvPicPr>
+          <p:cNvPr id="3" name="Picture 2">
+            <a:extLst>
+              <a:ext uri="{FF2B5EF4-FFF2-40B4-BE49-F238E27FC236}">
+                <a16:creationId xmlns:a16="http://schemas.microsoft.com/office/drawing/2014/main" id="{E1D9FA28-0A8B-4A59-934F-ACF6B80E1DB5}"/>
+              </a:ext>
+            </a:extLst>
+          </p:cNvPr>
+          <p:cNvPicPr>
+            <a:picLocks noChangeAspect="1"/>
+          </p:cNvPicPr>
+          <p:nvPr/>
+        </p:nvPicPr>
+        <p:blipFill>
+          <a:blip r:embed="rId3"/>
+          <a:stretch>
+            <a:fillRect/>
+          </a:stretch>
+        </p:blipFill>
+        <p:spPr>
+          <a:xfrm>
+            <a:off x="5675817" y="328221"/>
+            <a:ext cx="4084899" cy="2780562"/>
+          </a:xfrm>
+          <a:prstGeom prst="rect">
+            <a:avLst/>
+          </a:prstGeom>
+        </p:spPr>
+      </p:pic>
+      <p:sp>
+        <p:nvSpPr>
+          <p:cNvPr id="6" name="Arrow: Right 5">
+            <a:extLst>
+              <a:ext uri="{FF2B5EF4-FFF2-40B4-BE49-F238E27FC236}">
+                <a16:creationId xmlns:a16="http://schemas.microsoft.com/office/drawing/2014/main" id="{8B10AF4F-5D8D-4E60-9DC0-CD632A4F040B}"/>
+              </a:ext>
+            </a:extLst>
+          </p:cNvPr>
+          <p:cNvSpPr/>
+          <p:nvPr/>
+        </p:nvSpPr>
+        <p:spPr>
+          <a:xfrm>
+            <a:off x="5080393" y="2345049"/>
+            <a:ext cx="595424" cy="244549"/>
+          </a:xfrm>
+          <a:prstGeom prst="rightArrow">
+            <a:avLst/>
+          </a:prstGeom>
+        </p:spPr>
+        <p:style>
+          <a:lnRef idx="2">
+            <a:schemeClr val="accent1">
+              <a:shade val="50000"/>
+            </a:schemeClr>
+          </a:lnRef>
+          <a:fillRef idx="1">
+            <a:schemeClr val="accent1"/>
+          </a:fillRef>
+          <a:effectRef idx="0">
+            <a:schemeClr val="accent1"/>
+          </a:effectRef>
+          <a:fontRef idx="minor">
+            <a:schemeClr val="lt1"/>
+          </a:fontRef>
+        </p:style>
+        <p:txBody>
+          <a:bodyPr rtlCol="0" anchor="ctr"/>
+          <a:lstStyle/>
+          <a:p>
+            <a:pPr algn="ctr"/>
+            <a:endParaRPr lang="en-US"/>
+          </a:p>
+        </p:txBody>
+      </p:sp>
+      <p:sp>
+        <p:nvSpPr>
+          <p:cNvPr id="8" name="Arrow: Right 7">
+            <a:extLst>
+              <a:ext uri="{FF2B5EF4-FFF2-40B4-BE49-F238E27FC236}">
+                <a16:creationId xmlns:a16="http://schemas.microsoft.com/office/drawing/2014/main" id="{31C9177A-DB20-4F53-87E1-1069D40766C2}"/>
+              </a:ext>
+            </a:extLst>
+          </p:cNvPr>
+          <p:cNvSpPr/>
+          <p:nvPr/>
+        </p:nvSpPr>
+        <p:spPr>
+          <a:xfrm>
+            <a:off x="4890608" y="5823907"/>
+            <a:ext cx="595424" cy="244549"/>
+          </a:xfrm>
+          <a:prstGeom prst="rightArrow">
+            <a:avLst/>
+          </a:prstGeom>
+        </p:spPr>
+        <p:style>
+          <a:lnRef idx="2">
+            <a:schemeClr val="accent1">
+              <a:shade val="50000"/>
+            </a:schemeClr>
+          </a:lnRef>
+          <a:fillRef idx="1">
+            <a:schemeClr val="accent1"/>
+          </a:fillRef>
+          <a:effectRef idx="0">
+            <a:schemeClr val="accent1"/>
+          </a:effectRef>
+          <a:fontRef idx="minor">
+            <a:schemeClr val="lt1"/>
+          </a:fontRef>
+        </p:style>
+        <p:txBody>
+          <a:bodyPr rtlCol="0" anchor="ctr"/>
+          <a:lstStyle/>
+          <a:p>
+            <a:pPr algn="ctr"/>
+            <a:endParaRPr lang="en-US"/>
+          </a:p>
+        </p:txBody>
+      </p:sp>
+      <p:sp>
+        <p:nvSpPr>
+          <p:cNvPr id="9" name="TextBox 8">
+            <a:extLst>
+              <a:ext uri="{FF2B5EF4-FFF2-40B4-BE49-F238E27FC236}">
+                <a16:creationId xmlns:a16="http://schemas.microsoft.com/office/drawing/2014/main" id="{1DB96DB4-F943-4212-B1E0-F02E78E43333}"/>
+              </a:ext>
+            </a:extLst>
+          </p:cNvPr>
+          <p:cNvSpPr txBox="1"/>
+          <p:nvPr/>
+        </p:nvSpPr>
+        <p:spPr>
+          <a:xfrm>
+            <a:off x="10057903" y="3791746"/>
+            <a:ext cx="2030819" cy="1600438"/>
+          </a:xfrm>
+          <a:prstGeom prst="rect">
+            <a:avLst/>
+          </a:prstGeom>
+          <a:noFill/>
+          <a:ln>
+            <a:solidFill>
+              <a:schemeClr val="tx1"/>
+            </a:solidFill>
+          </a:ln>
+        </p:spPr>
+        <p:txBody>
+          <a:bodyPr wrap="square" rtlCol="0">
+            <a:spAutoFit/>
+          </a:bodyPr>
+          <a:lstStyle/>
+          <a:p>
+            <a:r>
+              <a:rPr lang="en-US" sz="1400" dirty="0"/>
+              <a:t>The “new method” appears to follow the input function much better. The slope of the fit lines for the input and reconstructed P(t) are the same.</a:t>
+            </a:r>
+          </a:p>
+        </p:txBody>
+      </p:sp>
+      <p:sp>
+        <p:nvSpPr>
+          <p:cNvPr id="10" name="TextBox 9">
+            <a:extLst>
+              <a:ext uri="{FF2B5EF4-FFF2-40B4-BE49-F238E27FC236}">
+                <a16:creationId xmlns:a16="http://schemas.microsoft.com/office/drawing/2014/main" id="{460AFBD1-8C36-4755-B24B-2470CCA54EC5}"/>
+              </a:ext>
+            </a:extLst>
+          </p:cNvPr>
+          <p:cNvSpPr txBox="1"/>
+          <p:nvPr/>
+        </p:nvSpPr>
+        <p:spPr>
+          <a:xfrm>
+            <a:off x="10054702" y="2259449"/>
+            <a:ext cx="2030820" cy="1169551"/>
+          </a:xfrm>
+          <a:prstGeom prst="rect">
+            <a:avLst/>
+          </a:prstGeom>
+          <a:noFill/>
+          <a:ln>
+            <a:solidFill>
+              <a:schemeClr val="tx1"/>
+            </a:solidFill>
+          </a:ln>
+        </p:spPr>
+        <p:txBody>
+          <a:bodyPr wrap="square" rtlCol="0">
+            <a:spAutoFit/>
+          </a:bodyPr>
+          <a:lstStyle/>
+          <a:p>
+            <a:r>
+              <a:rPr lang="en-US" sz="1400" dirty="0"/>
+              <a:t>These plots just show the probability amplitude as I varied </a:t>
+            </a:r>
+            <a:r>
+              <a:rPr lang="en-US" sz="1400" dirty="0" err="1"/>
+              <a:t>Gx^L</a:t>
+            </a:r>
+            <a:r>
+              <a:rPr lang="en-US" sz="1400" dirty="0"/>
+              <a:t> gate length. All parameters are equal between them.</a:t>
+            </a:r>
+          </a:p>
+        </p:txBody>
+      </p:sp>
     </p:spTree>
     <p:extLst>
       <p:ext uri="{BB962C8B-B14F-4D97-AF65-F5344CB8AC3E}">
         <p14:creationId xmlns:p14="http://schemas.microsoft.com/office/powerpoint/2010/main" val="2596845854"/>
+      </p:ext>
+    </p:extLst>
+  </p:cSld>
+  <p:clrMapOvr>
+    <a:masterClrMapping/>
+  </p:clrMapOvr>
+</p:sld>
+</file>
+
+<file path=ppt/slides/slide2.xml><?xml version="1.0" encoding="utf-8"?>
+<p:sld xmlns:a="http://schemas.openxmlformats.org/drawingml/2006/main" xmlns:r="http://schemas.openxmlformats.org/officeDocument/2006/relationships" xmlns:p="http://schemas.openxmlformats.org/presentationml/2006/main">
+  <p:cSld>
+    <p:spTree>
+      <p:nvGrpSpPr>
+        <p:cNvPr id="1" name=""/>
+        <p:cNvGrpSpPr/>
+        <p:nvPr/>
+      </p:nvGrpSpPr>
+      <p:grpSpPr>
+        <a:xfrm>
+          <a:off x="0" y="0"/>
+          <a:ext cx="0" cy="0"/>
+          <a:chOff x="0" y="0"/>
+          <a:chExt cx="0" cy="0"/>
+        </a:xfrm>
+      </p:grpSpPr>
+      <p:pic>
+        <p:nvPicPr>
+          <p:cNvPr id="2" name="Picture 1">
+            <a:extLst>
+              <a:ext uri="{FF2B5EF4-FFF2-40B4-BE49-F238E27FC236}">
+                <a16:creationId xmlns:a16="http://schemas.microsoft.com/office/drawing/2014/main" id="{B67435C6-1DBA-4A60-831B-FDDE52AFCF54}"/>
+              </a:ext>
+            </a:extLst>
+          </p:cNvPr>
+          <p:cNvPicPr>
+            <a:picLocks noChangeAspect="1"/>
+          </p:cNvPicPr>
+          <p:nvPr/>
+        </p:nvPicPr>
+        <p:blipFill>
+          <a:blip r:embed="rId2"/>
+          <a:stretch>
+            <a:fillRect/>
+          </a:stretch>
+        </p:blipFill>
+        <p:spPr>
+          <a:xfrm>
+            <a:off x="480348" y="468641"/>
+            <a:ext cx="8658225" cy="2981325"/>
+          </a:xfrm>
+          <a:prstGeom prst="rect">
+            <a:avLst/>
+          </a:prstGeom>
+        </p:spPr>
+      </p:pic>
+      <p:sp>
+        <p:nvSpPr>
+          <p:cNvPr id="3" name="TextBox 2">
+            <a:extLst>
+              <a:ext uri="{FF2B5EF4-FFF2-40B4-BE49-F238E27FC236}">
+                <a16:creationId xmlns:a16="http://schemas.microsoft.com/office/drawing/2014/main" id="{2C88BFC4-1E14-49B4-99DA-BF0168C4048F}"/>
+              </a:ext>
+            </a:extLst>
+          </p:cNvPr>
+          <p:cNvSpPr txBox="1"/>
+          <p:nvPr/>
+        </p:nvSpPr>
+        <p:spPr>
+          <a:xfrm>
+            <a:off x="2486986" y="3593805"/>
+            <a:ext cx="4644947" cy="1477328"/>
+          </a:xfrm>
+          <a:prstGeom prst="rect">
+            <a:avLst/>
+          </a:prstGeom>
+          <a:noFill/>
+        </p:spPr>
+        <p:txBody>
+          <a:bodyPr wrap="square" rtlCol="0">
+            <a:spAutoFit/>
+          </a:bodyPr>
+          <a:lstStyle/>
+          <a:p>
+            <a:r>
+              <a:rPr lang="en-US" dirty="0"/>
+              <a:t>Depending on your frequency spacing and whether you start at 0 time, it seems like you may actually get a minimum at 1.2 Hz (or the closest frequency), but have maxima adjacent to 1.2 Hz.</a:t>
+            </a:r>
+          </a:p>
+        </p:txBody>
+      </p:sp>
+    </p:spTree>
+    <p:extLst>
+      <p:ext uri="{BB962C8B-B14F-4D97-AF65-F5344CB8AC3E}">
+        <p14:creationId xmlns:p14="http://schemas.microsoft.com/office/powerpoint/2010/main" val="2230278902"/>
       </p:ext>
     </p:extLst>
   </p:cSld>

</xml_diff>